<commit_message>
Module 1 PPT changes
</commit_message>
<xml_diff>
--- a/Modules/01.GettingStarted/GettingStarted.Slides.pptx
+++ b/Modules/01.GettingStarted/GettingStarted.Slides.pptx
@@ -995,7 +995,7 @@
             </a:r>
             <a:r>
               <a:rPr lang="en-US" baseline="0" dirty="0" smtClean="0"/>
-              <a:t> which do cover the tools in greater detail.</a:t>
+              <a:t> which cover these tools in greater detail.</a:t>
             </a:r>
             <a:endParaRPr lang="en-US" dirty="0"/>
           </a:p>
@@ -3061,12 +3061,8 @@
           </a:p>
           <a:p>
             <a:r>
-              <a:rPr lang="en-US" baseline="0" smtClean="0"/>
-              <a:t>SHOW APPS </a:t>
-            </a:r>
-            <a:r>
               <a:rPr lang="en-US" baseline="0" dirty="0" smtClean="0"/>
-              <a:t>NOW</a:t>
+              <a:t>SHOW APPS NOW</a:t>
             </a:r>
             <a:endParaRPr lang="en-US" dirty="0"/>
           </a:p>
@@ -3176,6 +3172,49 @@
             </a:r>
           </a:p>
           <a:p>
+            <a:pPr marL="0" marR="0" indent="0" algn="l" defTabSz="914400" rtl="0" eaLnBrk="0" fontAlgn="base" latinLnBrk="0" hangingPunct="0">
+              <a:lnSpc>
+                <a:spcPct val="100000"/>
+              </a:lnSpc>
+              <a:spcBef>
+                <a:spcPct val="30000"/>
+              </a:spcBef>
+              <a:spcAft>
+                <a:spcPct val="0"/>
+              </a:spcAft>
+              <a:buClrTx/>
+              <a:buSzTx/>
+              <a:buFontTx/>
+              <a:buNone/>
+              <a:tabLst/>
+              <a:defRPr/>
+            </a:pPr>
+            <a:endParaRPr lang="en-US" baseline="0" dirty="0" smtClean="0"/>
+          </a:p>
+          <a:p>
+            <a:pPr marL="0" marR="0" indent="0" algn="l" defTabSz="914400" rtl="0" eaLnBrk="0" fontAlgn="base" latinLnBrk="0" hangingPunct="0">
+              <a:lnSpc>
+                <a:spcPct val="100000"/>
+              </a:lnSpc>
+              <a:spcBef>
+                <a:spcPct val="30000"/>
+              </a:spcBef>
+              <a:spcAft>
+                <a:spcPct val="0"/>
+              </a:spcAft>
+              <a:buClrTx/>
+              <a:buSzTx/>
+              <a:buFontTx/>
+              <a:buNone/>
+              <a:tabLst/>
+              <a:defRPr/>
+            </a:pPr>
+            <a:r>
+              <a:rPr lang="en-US" baseline="0" dirty="0" smtClean="0"/>
+              <a:t>[SHOW ANIMATION NOW]</a:t>
+            </a:r>
+          </a:p>
+          <a:p>
             <a:endParaRPr lang="en-US" baseline="0" dirty="0" smtClean="0"/>
           </a:p>
           <a:p>
@@ -3188,6 +3227,32 @@
             <a:endParaRPr lang="en-US" baseline="0" dirty="0" smtClean="0"/>
           </a:p>
           <a:p>
+            <a:pPr marL="0" marR="0" indent="0" algn="l" defTabSz="914400" rtl="0" eaLnBrk="0" fontAlgn="base" latinLnBrk="0" hangingPunct="0">
+              <a:lnSpc>
+                <a:spcPct val="100000"/>
+              </a:lnSpc>
+              <a:spcBef>
+                <a:spcPct val="30000"/>
+              </a:spcBef>
+              <a:spcAft>
+                <a:spcPct val="0"/>
+              </a:spcAft>
+              <a:buClrTx/>
+              <a:buSzTx/>
+              <a:buFontTx/>
+              <a:buNone/>
+              <a:tabLst/>
+              <a:defRPr/>
+            </a:pPr>
+            <a:r>
+              <a:rPr lang="en-US" baseline="0" dirty="0" smtClean="0"/>
+              <a:t>[SHOW ANIMATION NOW]</a:t>
+            </a:r>
+          </a:p>
+          <a:p>
+            <a:endParaRPr lang="en-US" baseline="0" dirty="0" smtClean="0"/>
+          </a:p>
+          <a:p>
             <a:r>
               <a:rPr lang="en-US" baseline="0" dirty="0" smtClean="0"/>
               <a:t>Next we will review all the tools and frameworks we will be utilizing in this course while making the transition from being a XAML developer to an HTML developer.</a:t>
@@ -3197,6 +3262,32 @@
             <a:endParaRPr lang="en-US" baseline="0" dirty="0" smtClean="0"/>
           </a:p>
           <a:p>
+            <a:pPr marL="0" marR="0" indent="0" algn="l" defTabSz="914400" rtl="0" eaLnBrk="0" fontAlgn="base" latinLnBrk="0" hangingPunct="0">
+              <a:lnSpc>
+                <a:spcPct val="100000"/>
+              </a:lnSpc>
+              <a:spcBef>
+                <a:spcPct val="30000"/>
+              </a:spcBef>
+              <a:spcAft>
+                <a:spcPct val="0"/>
+              </a:spcAft>
+              <a:buClrTx/>
+              <a:buSzTx/>
+              <a:buFontTx/>
+              <a:buNone/>
+              <a:tabLst/>
+              <a:defRPr/>
+            </a:pPr>
+            <a:r>
+              <a:rPr lang="en-US" baseline="0" dirty="0" smtClean="0"/>
+              <a:t>[SHOW ANIMATION NOW]</a:t>
+            </a:r>
+          </a:p>
+          <a:p>
+            <a:endParaRPr lang="en-US" baseline="0" dirty="0" smtClean="0"/>
+          </a:p>
+          <a:p>
             <a:r>
               <a:rPr lang="en-US" baseline="0" dirty="0" smtClean="0"/>
               <a:t>Following this we will actually crack open visual studio and create our first Asp.net MVC project, this will be the base template we will use for all of our coding demos in this course</a:t>
@@ -3206,9 +3297,61 @@
             <a:endParaRPr lang="en-US" baseline="0" dirty="0" smtClean="0"/>
           </a:p>
           <a:p>
+            <a:pPr marL="0" marR="0" indent="0" algn="l" defTabSz="914400" rtl="0" eaLnBrk="0" fontAlgn="base" latinLnBrk="0" hangingPunct="0">
+              <a:lnSpc>
+                <a:spcPct val="100000"/>
+              </a:lnSpc>
+              <a:spcBef>
+                <a:spcPct val="30000"/>
+              </a:spcBef>
+              <a:spcAft>
+                <a:spcPct val="0"/>
+              </a:spcAft>
+              <a:buClrTx/>
+              <a:buSzTx/>
+              <a:buFontTx/>
+              <a:buNone/>
+              <a:tabLst/>
+              <a:defRPr/>
+            </a:pPr>
+            <a:r>
+              <a:rPr lang="en-US" baseline="0" dirty="0" smtClean="0"/>
+              <a:t>[SHOW ANIMATION NOW]</a:t>
+            </a:r>
+          </a:p>
+          <a:p>
+            <a:endParaRPr lang="en-US" baseline="0" dirty="0" smtClean="0"/>
+          </a:p>
+          <a:p>
             <a:r>
               <a:rPr lang="en-US" baseline="0" dirty="0" smtClean="0"/>
               <a:t>After this will put all the pieces together and build a very simply hello world application to give you an example of what type of skills you will acquire in this course.</a:t>
+            </a:r>
+          </a:p>
+          <a:p>
+            <a:endParaRPr lang="en-US" baseline="0" dirty="0" smtClean="0"/>
+          </a:p>
+          <a:p>
+            <a:pPr marL="0" marR="0" indent="0" algn="l" defTabSz="914400" rtl="0" eaLnBrk="0" fontAlgn="base" latinLnBrk="0" hangingPunct="0">
+              <a:lnSpc>
+                <a:spcPct val="100000"/>
+              </a:lnSpc>
+              <a:spcBef>
+                <a:spcPct val="30000"/>
+              </a:spcBef>
+              <a:spcAft>
+                <a:spcPct val="0"/>
+              </a:spcAft>
+              <a:buClrTx/>
+              <a:buSzTx/>
+              <a:buFontTx/>
+              <a:buNone/>
+              <a:tabLst/>
+              <a:defRPr/>
+            </a:pPr>
+            <a:r>
+              <a:rPr lang="en-US" baseline="0" dirty="0" smtClean="0"/>
+              <a:t>[SHOW ANIMATION NOW]</a:t>
             </a:r>
           </a:p>
           <a:p>
@@ -6579,12 +6722,12 @@
   <p:clrMapOvr>
     <a:masterClrMapping/>
   </p:clrMapOvr>
-  <mc:AlternateContent xmlns:mc="http://schemas.openxmlformats.org/markup-compatibility/2006" xmlns:p14="http://schemas.microsoft.com/office/powerpoint/2010/main">
-    <mc:Choice Requires="p14">
-      <p:transition p14:dur="0"/>
+  <mc:AlternateContent xmlns:mc="http://schemas.openxmlformats.org/markup-compatibility/2006">
+    <mc:Choice xmlns:p14="http://schemas.microsoft.com/office/powerpoint/2010/main" Requires="p14">
+      <p:transition p14:dur="0" advTm="1765"/>
     </mc:Choice>
-    <mc:Fallback xmlns="">
-      <p:transition/>
+    <mc:Fallback>
+      <p:transition advTm="1765"/>
     </mc:Fallback>
   </mc:AlternateContent>
   <p:timing>
@@ -9261,11 +9404,11 @@
   <p:clrMapOvr>
     <a:masterClrMapping/>
   </p:clrMapOvr>
-  <mc:AlternateContent xmlns:mc="http://schemas.openxmlformats.org/markup-compatibility/2006" xmlns:p14="http://schemas.microsoft.com/office/powerpoint/2010/main">
-    <mc:Choice Requires="p14">
-      <p:transition p14:dur="0"/>
+  <mc:AlternateContent xmlns:mc="http://schemas.openxmlformats.org/markup-compatibility/2006">
+    <mc:Choice xmlns:p14="http://schemas.microsoft.com/office/powerpoint/2010/main" Requires="p14">
+      <p:transition p14:dur="10"/>
     </mc:Choice>
-    <mc:Fallback xmlns="">
+    <mc:Fallback>
       <p:transition/>
     </mc:Fallback>
   </mc:AlternateContent>
@@ -9981,96 +10124,9 @@
   <p:timing>
     <p:tnLst>
       <p:par>
-        <p:cTn id="1" dur="indefinite" restart="never" nodeType="tmRoot">
-          <p:childTnLst>
-            <p:seq concurrent="1" nextAc="seek">
-              <p:cTn id="2" dur="indefinite" nodeType="mainSeq">
-                <p:childTnLst>
-                  <p:par>
-                    <p:cTn id="3" fill="hold">
-                      <p:stCondLst>
-                        <p:cond delay="indefinite"/>
-                      </p:stCondLst>
-                      <p:childTnLst>
-                        <p:par>
-                          <p:cTn id="4" fill="hold">
-                            <p:stCondLst>
-                              <p:cond delay="0"/>
-                            </p:stCondLst>
-                            <p:childTnLst>
-                              <p:par>
-                                <p:cTn id="5" presetID="10" presetClass="entr" presetSubtype="0" fill="hold" grpId="0" nodeType="clickEffect">
-                                  <p:stCondLst>
-                                    <p:cond delay="0"/>
-                                  </p:stCondLst>
-                                  <p:childTnLst>
-                                    <p:set>
-                                      <p:cBhvr>
-                                        <p:cTn id="6" dur="1" fill="hold">
-                                          <p:stCondLst>
-                                            <p:cond delay="0"/>
-                                          </p:stCondLst>
-                                        </p:cTn>
-                                        <p:tgtEl>
-                                          <p:spTgt spid="3">
-                                            <p:txEl>
-                                              <p:pRg st="0" end="0"/>
-                                            </p:txEl>
-                                          </p:spTgt>
-                                        </p:tgtEl>
-                                        <p:attrNameLst>
-                                          <p:attrName>style.visibility</p:attrName>
-                                        </p:attrNameLst>
-                                      </p:cBhvr>
-                                      <p:to>
-                                        <p:strVal val="visible"/>
-                                      </p:to>
-                                    </p:set>
-                                    <p:animEffect transition="in" filter="fade">
-                                      <p:cBhvr>
-                                        <p:cTn id="7" dur="500"/>
-                                        <p:tgtEl>
-                                          <p:spTgt spid="3">
-                                            <p:txEl>
-                                              <p:pRg st="0" end="0"/>
-                                            </p:txEl>
-                                          </p:spTgt>
-                                        </p:tgtEl>
-                                      </p:cBhvr>
-                                    </p:animEffect>
-                                  </p:childTnLst>
-                                </p:cTn>
-                              </p:par>
-                            </p:childTnLst>
-                          </p:cTn>
-                        </p:par>
-                      </p:childTnLst>
-                    </p:cTn>
-                  </p:par>
-                </p:childTnLst>
-              </p:cTn>
-              <p:prevCondLst>
-                <p:cond evt="onPrev" delay="0">
-                  <p:tgtEl>
-                    <p:sldTgt/>
-                  </p:tgtEl>
-                </p:cond>
-              </p:prevCondLst>
-              <p:nextCondLst>
-                <p:cond evt="onNext" delay="0">
-                  <p:tgtEl>
-                    <p:sldTgt/>
-                  </p:tgtEl>
-                </p:cond>
-              </p:nextCondLst>
-            </p:seq>
-          </p:childTnLst>
-        </p:cTn>
+        <p:cTn id="1" dur="indefinite" restart="never" nodeType="tmRoot"/>
       </p:par>
     </p:tnLst>
-    <p:bldLst>
-      <p:bldP spid="3" grpId="0" build="p"/>
-    </p:bldLst>
   </p:timing>
 </p:sld>
 </file>

</xml_diff>

<commit_message>
fixing the silverlight project
</commit_message>
<xml_diff>
--- a/Modules/01.GettingStarted/GettingStarted.Slides.pptx
+++ b/Modules/01.GettingStarted/GettingStarted.Slides.pptx
@@ -5,10 +5,10 @@
     <p:sldMasterId id="2147483731" r:id="rId4"/>
   </p:sldMasterIdLst>
   <p:notesMasterIdLst>
-    <p:notesMasterId r:id="rId26"/>
+    <p:notesMasterId r:id="rId28"/>
   </p:notesMasterIdLst>
   <p:handoutMasterIdLst>
-    <p:handoutMasterId r:id="rId27"/>
+    <p:handoutMasterId r:id="rId29"/>
   </p:handoutMasterIdLst>
   <p:sldIdLst>
     <p:sldId id="356" r:id="rId5"/>
@@ -32,6 +32,8 @@
     <p:sldId id="369" r:id="rId23"/>
     <p:sldId id="375" r:id="rId24"/>
     <p:sldId id="367" r:id="rId25"/>
+    <p:sldId id="379" r:id="rId26"/>
+    <p:sldId id="378" r:id="rId27"/>
   </p:sldIdLst>
   <p:sldSz cx="9144000" cy="6858000" type="screen4x3"/>
   <p:notesSz cx="7315200" cy="9601200"/>
@@ -186,6 +188,8 @@
             <p14:sldId id="369"/>
             <p14:sldId id="375"/>
             <p14:sldId id="367"/>
+            <p14:sldId id="379"/>
+            <p14:sldId id="378"/>
           </p14:sldIdLst>
         </p14:section>
       </p14:sectionLst>
@@ -2413,8 +2417,18 @@
           <a:p>
             <a:r>
               <a:rPr lang="en-US" baseline="0" dirty="0" smtClean="0"/>
-              <a:t>Finally we will run the application to see the fruits of our labor in action.</a:t>
-            </a:r>
+              <a:t>Finally we will run the application to see the fruits of our labor in action</a:t>
+            </a:r>
+            <a:r>
+              <a:rPr lang="en-US" baseline="0" dirty="0" smtClean="0"/>
+              <a:t>.  This means it is time to open visual studio, lets get started</a:t>
+            </a:r>
+          </a:p>
+          <a:p>
+            <a:endParaRPr lang="en-US" baseline="0" dirty="0" smtClean="0"/>
+          </a:p>
+          <a:p>
+            <a:endParaRPr lang="en-US" baseline="0" dirty="0" smtClean="0"/>
           </a:p>
           <a:p>
             <a:endParaRPr lang="en-US" dirty="0"/>
@@ -2611,7 +2625,43 @@
             </a:r>
             <a:r>
               <a:rPr lang="en-US" baseline="0" dirty="0" smtClean="0"/>
-              <a:t> Template project completed and we know about the various libraries and frameworks we are going to use in this course so now would be a great time to build a very simple “Hello World” application.  This hello world application will allow us see many of the components in action in a very simple manor.  For this application I will not be comparing and contrasting differences between XAML and HTML but I will be doing this as we port the real application.  Again this is Hello World app is to illustrate how to use many of the tools and techniques to build HTML applications</a:t>
+              <a:t> Template project completed and we know about the various libraries and frameworks we are going to use in this </a:t>
+            </a:r>
+            <a:r>
+              <a:rPr lang="en-US" baseline="0" dirty="0" smtClean="0"/>
+              <a:t>course.  Now </a:t>
+            </a:r>
+            <a:r>
+              <a:rPr lang="en-US" baseline="0" dirty="0" smtClean="0"/>
+              <a:t>would be a great time to build a very simple “Hello World” application.  This </a:t>
+            </a:r>
+            <a:r>
+              <a:rPr lang="en-US" baseline="0" dirty="0" smtClean="0"/>
+              <a:t>application </a:t>
+            </a:r>
+            <a:r>
+              <a:rPr lang="en-US" baseline="0" dirty="0" smtClean="0"/>
+              <a:t>will allow us see many of the components in action in a very simple manor.  For this application I will not be comparing and contrasting differences between XAML and HTML </a:t>
+            </a:r>
+            <a:r>
+              <a:rPr lang="en-US" baseline="0" dirty="0" smtClean="0"/>
+              <a:t>because I </a:t>
+            </a:r>
+            <a:r>
+              <a:rPr lang="en-US" baseline="0" dirty="0" smtClean="0"/>
+              <a:t>will be doing this as we port the real application.  Again </a:t>
+            </a:r>
+            <a:r>
+              <a:rPr lang="en-US" baseline="0" dirty="0" smtClean="0"/>
+              <a:t>this application is simply a small example of the tools and techniques we are going to learn about </a:t>
+            </a:r>
+            <a:r>
+              <a:rPr lang="en-US" baseline="0" dirty="0" err="1" smtClean="0"/>
+              <a:t>thoughout</a:t>
+            </a:r>
+            <a:r>
+              <a:rPr lang="en-US" baseline="0" dirty="0" smtClean="0"/>
+              <a:t> this course.</a:t>
             </a:r>
             <a:endParaRPr lang="en-US" dirty="0"/>
           </a:p>
@@ -3085,8 +3135,13 @@
             </a:r>
             <a:r>
               <a:rPr lang="en-US" baseline="0" dirty="0" smtClean="0"/>
-              <a:t> have a basic understanding of how we are going to leverage our XAML skills to build HTML applications we might as well start looking at the Silverlight app we are going to port.  We should also take a look at the expected final HTML application we will be building in this course</a:t>
-            </a:r>
+              <a:t> have a basic understanding of how we are going to leverage our XAML skills to build HTML applications we might as well </a:t>
+            </a:r>
+            <a:r>
+              <a:rPr lang="en-US" baseline="0" dirty="0" smtClean="0"/>
+              <a:t>take a look at both the Silverlight application we are going to be porting along with the final HTML version of our ported app.</a:t>
+            </a:r>
+            <a:endParaRPr lang="en-US" baseline="0" dirty="0" smtClean="0"/>
           </a:p>
           <a:p>
             <a:endParaRPr lang="en-US" baseline="0" dirty="0" smtClean="0"/>
@@ -3133,6 +3188,296 @@
     <p:extLst>
       <p:ext uri="{BB962C8B-B14F-4D97-AF65-F5344CB8AC3E}">
         <p14:creationId xmlns:p14="http://schemas.microsoft.com/office/powerpoint/2010/main" val="1131122761"/>
+      </p:ext>
+    </p:extLst>
+  </p:cSld>
+  <p:clrMapOvr>
+    <a:masterClrMapping/>
+  </p:clrMapOvr>
+</p:notes>
+</file>
+
+<file path=ppt/notesSlides/notesSlide22.xml><?xml version="1.0" encoding="utf-8"?>
+<p:notes xmlns:a="http://schemas.openxmlformats.org/drawingml/2006/main" xmlns:r="http://schemas.openxmlformats.org/officeDocument/2006/relationships" xmlns:p="http://schemas.openxmlformats.org/presentationml/2006/main">
+  <p:cSld>
+    <p:spTree>
+      <p:nvGrpSpPr>
+        <p:cNvPr id="1" name=""/>
+        <p:cNvGrpSpPr/>
+        <p:nvPr/>
+      </p:nvGrpSpPr>
+      <p:grpSpPr>
+        <a:xfrm>
+          <a:off x="0" y="0"/>
+          <a:ext cx="0" cy="0"/>
+          <a:chOff x="0" y="0"/>
+          <a:chExt cx="0" cy="0"/>
+        </a:xfrm>
+      </p:grpSpPr>
+      <p:sp>
+        <p:nvSpPr>
+          <p:cNvPr id="2" name="Slide Image Placeholder 1"/>
+          <p:cNvSpPr>
+            <a:spLocks noGrp="1" noRot="1" noChangeAspect="1"/>
+          </p:cNvSpPr>
+          <p:nvPr>
+            <p:ph type="sldImg"/>
+          </p:nvPr>
+        </p:nvSpPr>
+        <p:spPr/>
+      </p:sp>
+      <p:sp>
+        <p:nvSpPr>
+          <p:cNvPr id="3" name="Notes Placeholder 2"/>
+          <p:cNvSpPr>
+            <a:spLocks noGrp="1"/>
+          </p:cNvSpPr>
+          <p:nvPr>
+            <p:ph type="body" idx="1"/>
+          </p:nvPr>
+        </p:nvSpPr>
+        <p:spPr/>
+        <p:txBody>
+          <a:bodyPr/>
+          <a:lstStyle/>
+          <a:p>
+            <a:endParaRPr lang="en-US" dirty="0"/>
+          </a:p>
+        </p:txBody>
+      </p:sp>
+      <p:sp>
+        <p:nvSpPr>
+          <p:cNvPr id="4" name="Slide Number Placeholder 3"/>
+          <p:cNvSpPr>
+            <a:spLocks noGrp="1"/>
+          </p:cNvSpPr>
+          <p:nvPr>
+            <p:ph type="sldNum" sz="quarter" idx="10"/>
+          </p:nvPr>
+        </p:nvSpPr>
+        <p:spPr/>
+        <p:txBody>
+          <a:bodyPr/>
+          <a:lstStyle/>
+          <a:p>
+            <a:pPr>
+              <a:defRPr/>
+            </a:pPr>
+            <a:fld id="{47C584BF-6945-4E60-B2A7-1638FF8EA8EE}" type="slidenum">
+              <a:rPr lang="en-US" smtClean="0">
+                <a:solidFill>
+                  <a:srgbClr val="000000"/>
+                </a:solidFill>
+              </a:rPr>
+              <a:pPr>
+                <a:defRPr/>
+              </a:pPr>
+              <a:t>22</a:t>
+            </a:fld>
+            <a:endParaRPr lang="en-US">
+              <a:solidFill>
+                <a:srgbClr val="000000"/>
+              </a:solidFill>
+            </a:endParaRPr>
+          </a:p>
+        </p:txBody>
+      </p:sp>
+    </p:spTree>
+    <p:extLst>
+      <p:ext uri="{BB962C8B-B14F-4D97-AF65-F5344CB8AC3E}">
+        <p14:creationId xmlns:p14="http://schemas.microsoft.com/office/powerpoint/2010/main" val="2481196778"/>
+      </p:ext>
+    </p:extLst>
+  </p:cSld>
+  <p:clrMapOvr>
+    <a:masterClrMapping/>
+  </p:clrMapOvr>
+</p:notes>
+</file>
+
+<file path=ppt/notesSlides/notesSlide23.xml><?xml version="1.0" encoding="utf-8"?>
+<p:notes xmlns:a="http://schemas.openxmlformats.org/drawingml/2006/main" xmlns:r="http://schemas.openxmlformats.org/officeDocument/2006/relationships" xmlns:p="http://schemas.openxmlformats.org/presentationml/2006/main">
+  <p:cSld>
+    <p:spTree>
+      <p:nvGrpSpPr>
+        <p:cNvPr id="1" name=""/>
+        <p:cNvGrpSpPr/>
+        <p:nvPr/>
+      </p:nvGrpSpPr>
+      <p:grpSpPr>
+        <a:xfrm>
+          <a:off x="0" y="0"/>
+          <a:ext cx="0" cy="0"/>
+          <a:chOff x="0" y="0"/>
+          <a:chExt cx="0" cy="0"/>
+        </a:xfrm>
+      </p:grpSpPr>
+      <p:sp>
+        <p:nvSpPr>
+          <p:cNvPr id="2" name="Slide Image Placeholder 1"/>
+          <p:cNvSpPr>
+            <a:spLocks noGrp="1" noRot="1" noChangeAspect="1"/>
+          </p:cNvSpPr>
+          <p:nvPr>
+            <p:ph type="sldImg"/>
+          </p:nvPr>
+        </p:nvSpPr>
+        <p:spPr/>
+      </p:sp>
+      <p:sp>
+        <p:nvSpPr>
+          <p:cNvPr id="3" name="Notes Placeholder 2"/>
+          <p:cNvSpPr>
+            <a:spLocks noGrp="1"/>
+          </p:cNvSpPr>
+          <p:nvPr>
+            <p:ph type="body" idx="1"/>
+          </p:nvPr>
+        </p:nvSpPr>
+        <p:spPr/>
+        <p:txBody>
+          <a:bodyPr/>
+          <a:lstStyle/>
+          <a:p>
+            <a:r>
+              <a:rPr lang="en-US" dirty="0" smtClean="0"/>
+              <a:t>In this module we explored</a:t>
+            </a:r>
+            <a:r>
+              <a:rPr lang="en-US" baseline="0" dirty="0" smtClean="0"/>
+              <a:t> everything we needed to know in order to get primed for making the transition from being a XAML developer to an HTML developer.  </a:t>
+            </a:r>
+          </a:p>
+          <a:p>
+            <a:endParaRPr lang="en-US" baseline="0" dirty="0" smtClean="0"/>
+          </a:p>
+          <a:p>
+            <a:r>
+              <a:rPr lang="en-US" baseline="0" dirty="0" smtClean="0"/>
+              <a:t>We took a look at how some of you </a:t>
+            </a:r>
+            <a:r>
+              <a:rPr lang="en-US" baseline="0" dirty="0" err="1" smtClean="0"/>
+              <a:t>xaml</a:t>
+            </a:r>
+            <a:r>
+              <a:rPr lang="en-US" baseline="0" dirty="0" smtClean="0"/>
+              <a:t> skills, such as binding and commanding, can easily translate to building HTML applications</a:t>
+            </a:r>
+          </a:p>
+          <a:p>
+            <a:endParaRPr lang="en-US" baseline="0" dirty="0" smtClean="0"/>
+          </a:p>
+          <a:p>
+            <a:r>
+              <a:rPr lang="en-US" baseline="0" dirty="0" smtClean="0"/>
+              <a:t>We learned about many of the tools we will be using </a:t>
+            </a:r>
+            <a:r>
+              <a:rPr lang="en-US" baseline="0" dirty="0" err="1" smtClean="0"/>
+              <a:t>throught</a:t>
+            </a:r>
+            <a:r>
+              <a:rPr lang="en-US" baseline="0" dirty="0" smtClean="0"/>
+              <a:t> this course, such as Knockout </a:t>
+            </a:r>
+            <a:r>
+              <a:rPr lang="en-US" baseline="0" dirty="0" err="1" smtClean="0"/>
+              <a:t>js</a:t>
+            </a:r>
+            <a:r>
+              <a:rPr lang="en-US" baseline="0" dirty="0" smtClean="0"/>
+              <a:t>, typescript and </a:t>
+            </a:r>
+            <a:r>
+              <a:rPr lang="en-US" baseline="0" dirty="0" err="1" smtClean="0"/>
+              <a:t>ASP.Net</a:t>
+            </a:r>
+            <a:r>
+              <a:rPr lang="en-US" baseline="0" dirty="0" smtClean="0"/>
+              <a:t> MVC</a:t>
+            </a:r>
+          </a:p>
+          <a:p>
+            <a:endParaRPr lang="en-US" baseline="0" dirty="0" smtClean="0"/>
+          </a:p>
+          <a:p>
+            <a:r>
+              <a:rPr lang="en-US" baseline="0" dirty="0" smtClean="0"/>
+              <a:t>We built our </a:t>
+            </a:r>
+            <a:r>
+              <a:rPr lang="en-US" baseline="0" dirty="0" err="1" smtClean="0"/>
+              <a:t>Asp.Net</a:t>
+            </a:r>
+            <a:r>
+              <a:rPr lang="en-US" baseline="0" dirty="0" smtClean="0"/>
+              <a:t> MVC template project which we will use as our base project during this course</a:t>
+            </a:r>
+          </a:p>
+          <a:p>
+            <a:endParaRPr lang="en-US" baseline="0" dirty="0" smtClean="0"/>
+          </a:p>
+          <a:p>
+            <a:r>
+              <a:rPr lang="en-US" baseline="0" dirty="0" smtClean="0"/>
+              <a:t>We built a very simple hello world application to demonstrate how to use some of the tools we will be learning about during this course</a:t>
+            </a:r>
+          </a:p>
+          <a:p>
+            <a:endParaRPr lang="en-US" baseline="0" dirty="0" smtClean="0"/>
+          </a:p>
+          <a:p>
+            <a:r>
+              <a:rPr lang="en-US" baseline="0" dirty="0" smtClean="0"/>
+              <a:t>We ended up by reviewing our reference Silverlight application we are going to be porting over to html in order to better understand our objectives for the course</a:t>
+            </a:r>
+          </a:p>
+          <a:p>
+            <a:endParaRPr lang="en-US" baseline="0" dirty="0" smtClean="0"/>
+          </a:p>
+          <a:p>
+            <a:r>
+              <a:rPr lang="en-US" baseline="0" dirty="0" smtClean="0"/>
+              <a:t>In the next module we will dive straight in and start the actual port of our reference application to html</a:t>
+            </a:r>
+            <a:endParaRPr lang="en-US" dirty="0"/>
+          </a:p>
+        </p:txBody>
+      </p:sp>
+      <p:sp>
+        <p:nvSpPr>
+          <p:cNvPr id="4" name="Slide Number Placeholder 3"/>
+          <p:cNvSpPr>
+            <a:spLocks noGrp="1"/>
+          </p:cNvSpPr>
+          <p:nvPr>
+            <p:ph type="sldNum" sz="quarter" idx="10"/>
+          </p:nvPr>
+        </p:nvSpPr>
+        <p:spPr/>
+        <p:txBody>
+          <a:bodyPr/>
+          <a:lstStyle/>
+          <a:p>
+            <a:pPr>
+              <a:defRPr/>
+            </a:pPr>
+            <a:fld id="{47C584BF-6945-4E60-B2A7-1638FF8EA8EE}" type="slidenum">
+              <a:rPr lang="en-US" smtClean="0"/>
+              <a:pPr>
+                <a:defRPr/>
+              </a:pPr>
+              <a:t>23</a:t>
+            </a:fld>
+            <a:endParaRPr lang="en-US"/>
+          </a:p>
+        </p:txBody>
+      </p:sp>
+    </p:spTree>
+    <p:extLst>
+      <p:ext uri="{BB962C8B-B14F-4D97-AF65-F5344CB8AC3E}">
+        <p14:creationId xmlns:p14="http://schemas.microsoft.com/office/powerpoint/2010/main" val="4217989557"/>
       </p:ext>
     </p:extLst>
   </p:cSld>
@@ -8385,8 +8730,17 @@
           <a:p>
             <a:r>
               <a:rPr lang="en-GB" dirty="0" smtClean="0"/>
-              <a:t>Run the MVC Template application</a:t>
-            </a:r>
+              <a:t>Run the MVC Template </a:t>
+            </a:r>
+            <a:r>
+              <a:rPr lang="en-GB" dirty="0" smtClean="0"/>
+              <a:t>application</a:t>
+            </a:r>
+          </a:p>
+          <a:p>
+            <a:pPr marL="0" indent="0">
+              <a:buNone/>
+            </a:pPr>
             <a:endParaRPr lang="en-GB" dirty="0"/>
           </a:p>
         </p:txBody>
@@ -9694,6 +10048,277 @@
     <p:extLst>
       <p:ext uri="{BB962C8B-B14F-4D97-AF65-F5344CB8AC3E}">
         <p14:creationId xmlns:p14="http://schemas.microsoft.com/office/powerpoint/2010/main" val="4152463932"/>
+      </p:ext>
+    </p:extLst>
+  </p:cSld>
+  <p:clrMapOvr>
+    <a:masterClrMapping/>
+  </p:clrMapOvr>
+  <p:transition>
+    <p:fade/>
+  </p:transition>
+  <p:timing>
+    <p:tnLst>
+      <p:par>
+        <p:cTn id="1" dur="indefinite" restart="never" nodeType="tmRoot"/>
+      </p:par>
+    </p:tnLst>
+  </p:timing>
+</p:sld>
+</file>
+
+<file path=ppt/slides/slide22.xml><?xml version="1.0" encoding="utf-8"?>
+<p:sld xmlns:a="http://schemas.openxmlformats.org/drawingml/2006/main" xmlns:r="http://schemas.openxmlformats.org/officeDocument/2006/relationships" xmlns:p="http://schemas.openxmlformats.org/presentationml/2006/main">
+  <p:cSld>
+    <p:bg>
+      <p:bgPr>
+        <a:solidFill>
+          <a:schemeClr val="accent2"/>
+        </a:solidFill>
+        <a:effectLst/>
+      </p:bgPr>
+    </p:bg>
+    <p:spTree>
+      <p:nvGrpSpPr>
+        <p:cNvPr id="1" name=""/>
+        <p:cNvGrpSpPr/>
+        <p:nvPr/>
+      </p:nvGrpSpPr>
+      <p:grpSpPr>
+        <a:xfrm>
+          <a:off x="0" y="0"/>
+          <a:ext cx="0" cy="0"/>
+          <a:chOff x="0" y="0"/>
+          <a:chExt cx="0" cy="0"/>
+        </a:xfrm>
+      </p:grpSpPr>
+      <p:sp>
+        <p:nvSpPr>
+          <p:cNvPr id="2" name="Title 1"/>
+          <p:cNvSpPr>
+            <a:spLocks noGrp="1"/>
+          </p:cNvSpPr>
+          <p:nvPr>
+            <p:ph type="title"/>
+          </p:nvPr>
+        </p:nvSpPr>
+        <p:spPr/>
+        <p:txBody>
+          <a:bodyPr/>
+          <a:lstStyle/>
+          <a:p>
+            <a:r>
+              <a:rPr lang="en-US" dirty="0" smtClean="0"/>
+              <a:t>END OF Hello World Slide</a:t>
+            </a:r>
+            <a:endParaRPr lang="en-GB" dirty="0"/>
+          </a:p>
+        </p:txBody>
+      </p:sp>
+      <p:sp>
+        <p:nvSpPr>
+          <p:cNvPr id="4" name="Text Placeholder 3"/>
+          <p:cNvSpPr>
+            <a:spLocks noGrp="1"/>
+          </p:cNvSpPr>
+          <p:nvPr>
+            <p:ph type="body" idx="1"/>
+          </p:nvPr>
+        </p:nvSpPr>
+        <p:spPr/>
+        <p:txBody>
+          <a:bodyPr/>
+          <a:lstStyle/>
+          <a:p>
+            <a:endParaRPr lang="en-US" dirty="0"/>
+          </a:p>
+        </p:txBody>
+      </p:sp>
+    </p:spTree>
+    <p:extLst>
+      <p:ext uri="{BB962C8B-B14F-4D97-AF65-F5344CB8AC3E}">
+        <p14:creationId xmlns:p14="http://schemas.microsoft.com/office/powerpoint/2010/main" val="3242019608"/>
+      </p:ext>
+    </p:extLst>
+  </p:cSld>
+  <p:clrMapOvr>
+    <a:masterClrMapping/>
+  </p:clrMapOvr>
+  <p:transition>
+    <p:fade/>
+  </p:transition>
+  <p:timing>
+    <p:tnLst>
+      <p:par>
+        <p:cTn id="1" dur="indefinite" restart="never" nodeType="tmRoot"/>
+      </p:par>
+    </p:tnLst>
+  </p:timing>
+</p:sld>
+</file>
+
+<file path=ppt/slides/slide23.xml><?xml version="1.0" encoding="utf-8"?>
+<p:sld xmlns:a="http://schemas.openxmlformats.org/drawingml/2006/main" xmlns:r="http://schemas.openxmlformats.org/officeDocument/2006/relationships" xmlns:p="http://schemas.openxmlformats.org/presentationml/2006/main">
+  <p:cSld>
+    <p:spTree>
+      <p:nvGrpSpPr>
+        <p:cNvPr id="1" name=""/>
+        <p:cNvGrpSpPr/>
+        <p:nvPr/>
+      </p:nvGrpSpPr>
+      <p:grpSpPr>
+        <a:xfrm>
+          <a:off x="0" y="0"/>
+          <a:ext cx="0" cy="0"/>
+          <a:chOff x="0" y="0"/>
+          <a:chExt cx="0" cy="0"/>
+        </a:xfrm>
+      </p:grpSpPr>
+      <p:sp>
+        <p:nvSpPr>
+          <p:cNvPr id="2" name="Title 1"/>
+          <p:cNvSpPr>
+            <a:spLocks noGrp="1"/>
+          </p:cNvSpPr>
+          <p:nvPr>
+            <p:ph type="title"/>
+          </p:nvPr>
+        </p:nvSpPr>
+        <p:spPr/>
+        <p:txBody>
+          <a:bodyPr/>
+          <a:lstStyle/>
+          <a:p>
+            <a:r>
+              <a:rPr lang="en-US" dirty="0" smtClean="0"/>
+              <a:t>Summary</a:t>
+            </a:r>
+            <a:r>
+              <a:rPr lang="en-US" dirty="0" smtClean="0"/>
+              <a:t>		</a:t>
+            </a:r>
+            <a:endParaRPr lang="en-GB" dirty="0"/>
+          </a:p>
+        </p:txBody>
+      </p:sp>
+      <p:sp>
+        <p:nvSpPr>
+          <p:cNvPr id="3" name="Text Placeholder 2"/>
+          <p:cNvSpPr>
+            <a:spLocks noGrp="1"/>
+          </p:cNvSpPr>
+          <p:nvPr>
+            <p:ph type="body" idx="1"/>
+          </p:nvPr>
+        </p:nvSpPr>
+        <p:spPr/>
+        <p:txBody>
+          <a:bodyPr/>
+          <a:lstStyle/>
+          <a:p>
+            <a:r>
+              <a:rPr lang="en-US" dirty="0" smtClean="0">
+                <a:latin typeface="+mn-lt"/>
+              </a:rPr>
+              <a:t>How </a:t>
+            </a:r>
+            <a:r>
+              <a:rPr lang="en-US" dirty="0" smtClean="0">
+                <a:latin typeface="+mn-lt"/>
+              </a:rPr>
+              <a:t>to leverage </a:t>
+            </a:r>
+            <a:r>
+              <a:rPr lang="en-US" dirty="0" smtClean="0">
+                <a:latin typeface="+mn-lt"/>
+              </a:rPr>
+              <a:t>our XAML </a:t>
+            </a:r>
+            <a:r>
+              <a:rPr lang="en-US" dirty="0" smtClean="0">
+                <a:latin typeface="+mn-lt"/>
+              </a:rPr>
+              <a:t>skills </a:t>
+            </a:r>
+            <a:r>
+              <a:rPr lang="en-US" dirty="0" smtClean="0">
+                <a:latin typeface="+mn-lt"/>
+              </a:rPr>
+              <a:t>for building HTML </a:t>
+            </a:r>
+            <a:r>
+              <a:rPr lang="en-US" dirty="0" smtClean="0">
+                <a:latin typeface="+mn-lt"/>
+              </a:rPr>
+              <a:t>applications</a:t>
+            </a:r>
+          </a:p>
+          <a:p>
+            <a:r>
+              <a:rPr lang="en-GB" dirty="0" smtClean="0"/>
+              <a:t>Learned about </a:t>
+            </a:r>
+            <a:r>
+              <a:rPr lang="en-GB" dirty="0"/>
+              <a:t>the tools we are going to </a:t>
+            </a:r>
+            <a:endParaRPr lang="en-GB" dirty="0" smtClean="0"/>
+          </a:p>
+          <a:p>
+            <a:r>
+              <a:rPr lang="en-GB" dirty="0" smtClean="0"/>
+              <a:t>Built our </a:t>
+            </a:r>
+            <a:r>
+              <a:rPr lang="en-GB" dirty="0" err="1" smtClean="0"/>
+              <a:t>Asp.Net</a:t>
+            </a:r>
+            <a:r>
+              <a:rPr lang="en-GB" dirty="0" smtClean="0"/>
+              <a:t> </a:t>
+            </a:r>
+            <a:r>
+              <a:rPr lang="en-GB" dirty="0"/>
+              <a:t>MVC </a:t>
+            </a:r>
+            <a:r>
+              <a:rPr lang="en-GB" dirty="0"/>
+              <a:t>t</a:t>
+            </a:r>
+            <a:r>
+              <a:rPr lang="en-GB" dirty="0" smtClean="0"/>
+              <a:t>emplate project</a:t>
+            </a:r>
+            <a:endParaRPr lang="en-GB" dirty="0"/>
+          </a:p>
+          <a:p>
+            <a:r>
+              <a:rPr lang="en-GB" dirty="0" smtClean="0"/>
+              <a:t>Implemented </a:t>
+            </a:r>
+            <a:r>
+              <a:rPr lang="en-GB" dirty="0" smtClean="0"/>
+              <a:t>a Hello World </a:t>
+            </a:r>
+            <a:r>
+              <a:rPr lang="en-GB" dirty="0" smtClean="0"/>
+              <a:t> application</a:t>
+            </a:r>
+            <a:endParaRPr lang="en-GB" dirty="0" smtClean="0"/>
+          </a:p>
+          <a:p>
+            <a:r>
+              <a:rPr lang="en-GB" dirty="0" smtClean="0"/>
+              <a:t>Reviewed our sample applications</a:t>
+            </a:r>
+            <a:endParaRPr lang="en-GB" dirty="0"/>
+          </a:p>
+        </p:txBody>
+      </p:sp>
+    </p:spTree>
+    <p:extLst>
+      <p:ext uri="{BB962C8B-B14F-4D97-AF65-F5344CB8AC3E}">
+        <p14:creationId xmlns:p14="http://schemas.microsoft.com/office/powerpoint/2010/main" val="670543702"/>
       </p:ext>
     </p:extLst>
   </p:cSld>

</xml_diff>